<commit_message>
some modifications on the weekly
</commit_message>
<xml_diff>
--- a/pssif/doc/weeklies/weekly_2014-03-12.pptx
+++ b/pssif/doc/weeklies/weekly_2014-03-12.pptx
@@ -363,7 +363,7 @@
             <a:fld id="{9BC6B371-79AC-4BBD-9187-12AECEB10A9C}" type="slidenum">
               <a:rPr lang="de-DE"/>
               <a:pPr/>
-              <a:t>‹#›</a:t>
+              <a:t>‹Nr.›</a:t>
             </a:fld>
             <a:endParaRPr lang="de-DE"/>
           </a:p>
@@ -692,7 +692,7 @@
             <a:fld id="{D3AC6F85-708C-42B2-9032-06E90D536D20}" type="slidenum">
               <a:rPr lang="de-DE"/>
               <a:pPr/>
-              <a:t>‹#›</a:t>
+              <a:t>‹Nr.›</a:t>
             </a:fld>
             <a:endParaRPr lang="de-DE"/>
           </a:p>
@@ -1215,7 +1215,7 @@
             <a:fld id="{85D5C05C-9F7C-4F22-9F68-AB3DA33C175C}" type="slidenum">
               <a:rPr lang="de-DE"/>
               <a:pPr/>
-              <a:t>‹#›</a:t>
+              <a:t>‹Nr.›</a:t>
             </a:fld>
             <a:endParaRPr lang="de-DE"/>
           </a:p>
@@ -1413,7 +1413,7 @@
             <a:fld id="{4503716B-59A6-44E1-ACEF-D72A2F4905FF}" type="slidenum">
               <a:rPr lang="de-DE"/>
               <a:pPr/>
-              <a:t>‹#›</a:t>
+              <a:t>‹Nr.›</a:t>
             </a:fld>
             <a:endParaRPr lang="de-DE"/>
           </a:p>
@@ -1601,7 +1601,7 @@
             <a:fld id="{3CB3C49A-EA8B-4220-9594-C4EC81BC1355}" type="slidenum">
               <a:rPr lang="de-DE"/>
               <a:pPr/>
-              <a:t>‹#›</a:t>
+              <a:t>‹Nr.›</a:t>
             </a:fld>
             <a:endParaRPr lang="de-DE"/>
           </a:p>
@@ -1811,7 +1811,7 @@
             <a:fld id="{3C332DD0-24CB-48A2-B6DF-11C8F02D840B}" type="slidenum">
               <a:rPr lang="de-DE"/>
               <a:pPr/>
-              <a:t>‹#›</a:t>
+              <a:t>‹Nr.›</a:t>
             </a:fld>
             <a:endParaRPr lang="de-DE"/>
           </a:p>
@@ -2117,7 +2117,7 @@
             <a:fld id="{7B0CEBF5-DA0C-46DC-99B4-EE93D78F6AD3}" type="slidenum">
               <a:rPr lang="de-DE"/>
               <a:pPr/>
-              <a:t>‹#›</a:t>
+              <a:t>‹Nr.›</a:t>
             </a:fld>
             <a:endParaRPr lang="de-DE"/>
           </a:p>
@@ -2562,7 +2562,7 @@
             <a:fld id="{485F47C4-B8F9-4A8A-93D5-04EF76B02069}" type="slidenum">
               <a:rPr lang="de-DE"/>
               <a:pPr/>
-              <a:t>‹#›</a:t>
+              <a:t>‹Nr.›</a:t>
             </a:fld>
             <a:endParaRPr lang="de-DE"/>
           </a:p>
@@ -2698,7 +2698,7 @@
             <a:fld id="{003891C6-7679-44B6-9CF4-B8D95D8A3D15}" type="slidenum">
               <a:rPr lang="de-DE"/>
               <a:pPr/>
-              <a:t>‹#›</a:t>
+              <a:t>‹Nr.›</a:t>
             </a:fld>
             <a:endParaRPr lang="de-DE"/>
           </a:p>
@@ -2811,7 +2811,7 @@
             <a:fld id="{CF507ADA-6B77-4461-AB4D-4B7CC72EF54A}" type="slidenum">
               <a:rPr lang="de-DE"/>
               <a:pPr/>
-              <a:t>‹#›</a:t>
+              <a:t>‹Nr.›</a:t>
             </a:fld>
             <a:endParaRPr lang="de-DE"/>
           </a:p>
@@ -3106,7 +3106,7 @@
             <a:fld id="{F4B3B2BA-A80D-41BF-AD7E-2078E989C63C}" type="slidenum">
               <a:rPr lang="de-DE"/>
               <a:pPr/>
-              <a:t>‹#›</a:t>
+              <a:t>‹Nr.›</a:t>
             </a:fld>
             <a:endParaRPr lang="de-DE"/>
           </a:p>
@@ -3382,7 +3382,7 @@
             <a:fld id="{48D264D6-4CCB-4E65-94FC-D522B92084D4}" type="slidenum">
               <a:rPr lang="de-DE"/>
               <a:pPr/>
-              <a:t>‹#›</a:t>
+              <a:t>‹Nr.›</a:t>
             </a:fld>
             <a:endParaRPr lang="de-DE"/>
           </a:p>
@@ -3707,7 +3707,7 @@
             <a:fld id="{7550EBF1-8590-4B63-A0F3-9E0E17459843}" type="slidenum">
               <a:rPr lang="de-DE"/>
               <a:pPr/>
-              <a:t>‹#›</a:t>
+              <a:t>‹Nr.›</a:t>
             </a:fld>
             <a:endParaRPr lang="de-DE"/>
           </a:p>
@@ -4217,13 +4217,8 @@
             </a:pPr>
             <a:r>
               <a:rPr lang="de-DE" dirty="0" smtClean="0"/>
-              <a:t>12</a:t>
-            </a:r>
-            <a:r>
-              <a:rPr lang="de-DE" dirty="0" smtClean="0"/>
-              <a:t>.03.2014</a:t>
-            </a:r>
-            <a:endParaRPr lang="de-DE" dirty="0" smtClean="0"/>
+              <a:t>12.03.2014</a:t>
+            </a:r>
           </a:p>
         </p:txBody>
       </p:sp>
@@ -4460,20 +4455,44 @@
           <a:p>
             <a:r>
               <a:rPr lang="de-DE" dirty="0" smtClean="0"/>
-              <a:t>PSS-IF Kern neu geschrieben mit diverse Verbesserungen, insb. Knoten mit Kantensemantik.</a:t>
-            </a:r>
-          </a:p>
-          <a:p>
+              <a:t>PSS-IF Kern wesentlich vereinfacht</a:t>
+            </a:r>
+          </a:p>
+          <a:p>
+            <a:pPr lvl="1"/>
             <a:r>
               <a:rPr lang="de-DE" dirty="0" smtClean="0"/>
-              <a:t>UFP Transformationen erledigt.</a:t>
-            </a:r>
-          </a:p>
-          <a:p>
+              <a:t>keine Hyperkanten mehr</a:t>
+            </a:r>
+          </a:p>
+          <a:p>
+            <a:pPr lvl="1"/>
             <a:r>
               <a:rPr lang="de-DE" dirty="0" smtClean="0"/>
-              <a:t>EPK Transformationen erledigt.</a:t>
-            </a:r>
+              <a:t>Knoten mit Kantensemantik</a:t>
+            </a:r>
+          </a:p>
+          <a:p>
+            <a:r>
+              <a:rPr lang="de-DE" dirty="0" smtClean="0"/>
+              <a:t>Metamodelle der Import/Export Sprachen als Views auf kanonisches Metamodell definiert</a:t>
+            </a:r>
+          </a:p>
+          <a:p>
+            <a:pPr lvl="1"/>
+            <a:r>
+              <a:rPr lang="de-DE" dirty="0" smtClean="0"/>
+              <a:t>UFM erledigt</a:t>
+            </a:r>
+            <a:endParaRPr lang="de-DE" dirty="0" smtClean="0"/>
+          </a:p>
+          <a:p>
+            <a:pPr lvl="1"/>
+            <a:r>
+              <a:rPr lang="de-DE" dirty="0" smtClean="0"/>
+              <a:t>EPK erledigt</a:t>
+            </a:r>
+            <a:endParaRPr lang="de-DE" dirty="0" smtClean="0"/>
           </a:p>
           <a:p>
             <a:r>
@@ -4685,7 +4704,6 @@
               <a:rPr lang="de-DE" dirty="0" smtClean="0"/>
               <a:t>Standartisierte Serialisierung, e.g. eCore+XMI.</a:t>
             </a:r>
-            <a:endParaRPr lang="de-DE" dirty="0" smtClean="0"/>
           </a:p>
           <a:p>
             <a:endParaRPr lang="de-DE" dirty="0" smtClean="0"/>
@@ -4849,14 +4867,28 @@
             <a:pPr lvl="1"/>
             <a:r>
               <a:rPr lang="de-DE" dirty="0" smtClean="0"/>
-              <a:t>Anderes Format spezifizieren</a:t>
+              <a:t>Anderes Format </a:t>
+            </a:r>
+            <a:r>
+              <a:rPr lang="de-DE" dirty="0" smtClean="0"/>
+              <a:t>spezifizieren</a:t>
+            </a:r>
+          </a:p>
+          <a:p>
+            <a:r>
+              <a:rPr lang="de-DE" dirty="0" smtClean="0"/>
+              <a:t>Kern </a:t>
+            </a:r>
+            <a:r>
+              <a:rPr lang="de-DE" dirty="0" err="1" smtClean="0"/>
+              <a:t>finalisieren</a:t>
             </a:r>
             <a:endParaRPr lang="de-DE" dirty="0" smtClean="0"/>
           </a:p>
           <a:p>
             <a:r>
               <a:rPr lang="de-DE" dirty="0" smtClean="0"/>
-              <a:t>Dokumentation weiter erstellen.</a:t>
+              <a:t>Dokumentation</a:t>
             </a:r>
             <a:endParaRPr lang="de-DE" dirty="0" smtClean="0"/>
           </a:p>

</xml_diff>